<commit_message>
added RouteColorsController and PowerPoint
</commit_message>
<xml_diff>
--- a/presentation/HackathonPresentation.pptx
+++ b/presentation/HackathonPresentation.pptx
@@ -2,14 +2,14 @@
 <file path=ppt/presentation.xml><?xml version="1.0" encoding="utf-8"?>
 <p:presentation xmlns:a="http://schemas.openxmlformats.org/drawingml/2006/main" xmlns:r="http://schemas.openxmlformats.org/officeDocument/2006/relationships" xmlns:p="http://schemas.openxmlformats.org/presentationml/2006/main" saveSubsetFonts="1">
   <p:sldMasterIdLst>
-    <p:sldMasterId id="2147483648" r:id="rId23"/>
-    <p:sldMasterId id="2147483660" r:id="rId24"/>
+    <p:sldMasterId id="2147483648" r:id="rId4"/>
+    <p:sldMasterId id="2147483660" r:id="rId5"/>
   </p:sldMasterIdLst>
   <p:notesMasterIdLst>
-    <p:notesMasterId r:id="rId26"/>
+    <p:notesMasterId r:id="rId7"/>
   </p:notesMasterIdLst>
   <p:sldIdLst>
-    <p:sldId id="301" r:id="rId25"/>
+    <p:sldId id="301" r:id="rId6"/>
   </p:sldIdLst>
   <p:sldSz cx="9144000" cy="6858000" type="screen4x3"/>
   <p:notesSz cx="6858000" cy="9144000"/>
@@ -4118,6 +4118,171 @@
           <a:chExt cx="0" cy="0"/>
         </a:xfrm>
       </p:grpSpPr>
+      <p:pic>
+        <p:nvPicPr>
+          <p:cNvPr id="13" name="Picture 12"/>
+          <p:cNvPicPr>
+            <a:picLocks noChangeAspect="1"/>
+          </p:cNvPicPr>
+          <p:nvPr/>
+        </p:nvPicPr>
+        <p:blipFill>
+          <a:blip r:embed="rId3">
+            <a:extLst>
+              <a:ext uri="{28A0092B-C50C-407E-A947-70E740481C1C}">
+                <a14:useLocalDpi xmlns:a14="http://schemas.microsoft.com/office/drawing/2010/main" val="0"/>
+              </a:ext>
+            </a:extLst>
+          </a:blip>
+          <a:stretch>
+            <a:fillRect/>
+          </a:stretch>
+        </p:blipFill>
+        <p:spPr>
+          <a:xfrm rot="21286628">
+            <a:off x="950455" y="-19076"/>
+            <a:ext cx="3201113" cy="5960693"/>
+          </a:xfrm>
+          <a:prstGeom prst="rect">
+            <a:avLst/>
+          </a:prstGeom>
+          <a:noFill/>
+          <a:ln>
+            <a:noFill/>
+          </a:ln>
+        </p:spPr>
+      </p:pic>
+      <p:pic>
+        <p:nvPicPr>
+          <p:cNvPr id="7" name="Picture 6"/>
+          <p:cNvPicPr>
+            <a:picLocks noChangeAspect="1"/>
+          </p:cNvPicPr>
+          <p:nvPr/>
+        </p:nvPicPr>
+        <p:blipFill>
+          <a:blip r:embed="rId4"/>
+          <a:stretch>
+            <a:fillRect/>
+          </a:stretch>
+        </p:blipFill>
+        <p:spPr>
+          <a:xfrm>
+            <a:off x="3886200" y="2895600"/>
+            <a:ext cx="7499377" cy="4079850"/>
+          </a:xfrm>
+          <a:prstGeom prst="rect">
+            <a:avLst/>
+          </a:prstGeom>
+        </p:spPr>
+      </p:pic>
+      <p:pic>
+        <p:nvPicPr>
+          <p:cNvPr id="1030" name="Picture 6" descr="http://upload.wikimedia.org/wikipedia/commons/thumb/5/56/Asheville_Redefines_Transit_logo.png/220px-Asheville_Redefines_Transit_logo.png"/>
+          <p:cNvPicPr>
+            <a:picLocks noChangeAspect="1" noChangeArrowheads="1"/>
+          </p:cNvPicPr>
+          <p:nvPr/>
+        </p:nvPicPr>
+        <p:blipFill>
+          <a:blip r:embed="rId5">
+            <a:extLst>
+              <a:ext uri="{28A0092B-C50C-407E-A947-70E740481C1C}">
+                <a14:useLocalDpi xmlns:a14="http://schemas.microsoft.com/office/drawing/2010/main" val="0"/>
+              </a:ext>
+            </a:extLst>
+          </a:blip>
+          <a:srcRect/>
+          <a:stretch>
+            <a:fillRect/>
+          </a:stretch>
+        </p:blipFill>
+        <p:spPr bwMode="auto">
+          <a:xfrm>
+            <a:off x="5959488" y="1548824"/>
+            <a:ext cx="2514600" cy="948691"/>
+          </a:xfrm>
+          <a:prstGeom prst="rect">
+            <a:avLst/>
+          </a:prstGeom>
+          <a:noFill/>
+          <a:extLst>
+            <a:ext uri="{909E8E84-426E-40DD-AFC4-6F175D3DCCD1}">
+              <a14:hiddenFill xmlns:a14="http://schemas.microsoft.com/office/drawing/2010/main">
+                <a:solidFill>
+                  <a:srgbClr val="FFFFFF"/>
+                </a:solidFill>
+              </a14:hiddenFill>
+            </a:ext>
+          </a:extLst>
+        </p:spPr>
+      </p:pic>
+      <p:pic>
+        <p:nvPicPr>
+          <p:cNvPr id="8" name="Picture 7"/>
+          <p:cNvPicPr>
+            <a:picLocks noChangeAspect="1"/>
+          </p:cNvPicPr>
+          <p:nvPr/>
+        </p:nvPicPr>
+        <p:blipFill>
+          <a:blip r:embed="rId6">
+            <a:extLst>
+              <a:ext uri="{28A0092B-C50C-407E-A947-70E740481C1C}">
+                <a14:useLocalDpi xmlns:a14="http://schemas.microsoft.com/office/drawing/2010/main" val="0"/>
+              </a:ext>
+            </a:extLst>
+          </a:blip>
+          <a:stretch>
+            <a:fillRect/>
+          </a:stretch>
+        </p:blipFill>
+        <p:spPr>
+          <a:xfrm>
+            <a:off x="5982497" y="356838"/>
+            <a:ext cx="2132005" cy="948691"/>
+          </a:xfrm>
+          <a:prstGeom prst="rect">
+            <a:avLst/>
+          </a:prstGeom>
+        </p:spPr>
+      </p:pic>
+      <p:sp>
+        <p:nvSpPr>
+          <p:cNvPr id="14" name="TextBox 13"/>
+          <p:cNvSpPr txBox="1"/>
+          <p:nvPr/>
+        </p:nvSpPr>
+        <p:spPr>
+          <a:xfrm>
+            <a:off x="304800" y="6011362"/>
+            <a:ext cx="3768980" cy="923330"/>
+          </a:xfrm>
+          <a:prstGeom prst="rect">
+            <a:avLst/>
+          </a:prstGeom>
+          <a:noFill/>
+        </p:spPr>
+        <p:txBody>
+          <a:bodyPr wrap="none" rtlCol="0">
+            <a:spAutoFit/>
+          </a:bodyPr>
+          <a:lstStyle/>
+          <a:p>
+            <a:r>
+              <a:rPr lang="en-US" sz="5400" dirty="0" smtClean="0">
+                <a:latin typeface="Adobe Heiti Std R" panose="020B0400000000000000" pitchFamily="34" charset="-128"/>
+                <a:ea typeface="Adobe Heiti Std R" panose="020B0400000000000000" pitchFamily="34" charset="-128"/>
+              </a:rPr>
+              <a:t>avlbus.com</a:t>
+            </a:r>
+            <a:endParaRPr lang="en-US" sz="5400" dirty="0">
+              <a:latin typeface="Adobe Heiti Std R" panose="020B0400000000000000" pitchFamily="34" charset="-128"/>
+              <a:ea typeface="Adobe Heiti Std R" panose="020B0400000000000000" pitchFamily="34" charset="-128"/>
+            </a:endParaRPr>
+          </a:p>
+        </p:txBody>
+      </p:sp>
     </p:spTree>
   </p:cSld>
   <p:clrMapOvr>
@@ -4987,91 +5152,13 @@
 
 <file path=customXml/item1.xml><?xml version="1.0" encoding="utf-8"?>
 <Control xmlns="http://schemas.microsoft.com/VisualStudio/2011/storyboarding/control">
-  <Id Name="a2c8d44d-9667-4c53-9e49-e310e6246c4a" RevisionId="9b2c8de1-5094-4c28-9871-718be66a8830" Stencil="172d6d98-e5c9-42e9-a209-79f7a94bbd38" StencilRevisionId="00000000-0000-0000-0000-000000000000" StencilVersion="0.0"/>
-</Control>
-</file>
-
-<file path=customXml/item10.xml><?xml version="1.0" encoding="utf-8"?>
-<Control xmlns="http://schemas.microsoft.com/VisualStudio/2011/storyboarding/control">
-  <Id Name="System.Storyboarding.WindowsApps.WindowsAppsListBox" Revision="1" Stencil="System.Storyboarding.WindowsApps" StencilVersion="0.1"/>
-</Control>
-</file>
-
-<file path=customXml/item11.xml><?xml version="1.0" encoding="utf-8"?>
-<Control xmlns="http://schemas.microsoft.com/VisualStudio/2011/storyboarding/control">
-  <Id Name="System.Storyboarding.WindowsApps.WindowsAppsTileLarge" Revision="1" Stencil="System.Storyboarding.WindowsApps" StencilVersion="0.1"/>
-</Control>
-</file>
-
-<file path=customXml/item12.xml><?xml version="1.0" encoding="utf-8"?>
-<Control xmlns="http://schemas.microsoft.com/VisualStudio/2011/storyboarding/control">
-  <Id Name="System.Storyboarding.WindowsApps.WindowsAppsTileLarge" Revision="1" Stencil="System.Storyboarding.WindowsApps" StencilVersion="0.1"/>
-</Control>
-</file>
-
-<file path=customXml/item13.xml><?xml version="1.0" encoding="utf-8"?>
-<Control xmlns="http://schemas.microsoft.com/VisualStudio/2011/storyboarding/control">
-  <Id Name="System.Storyboarding.WindowsAppIcons.BaseCircle" Revision="1" Stencil="System.Storyboarding.WindowsAppIcons" StencilVersion="0.1"/>
-</Control>
-</file>
-
-<file path=customXml/item14.xml><?xml version="1.0" encoding="utf-8"?>
-<Control xmlns="http://schemas.microsoft.com/VisualStudio/2011/storyboarding/control">
-  <Id Name="System.Storyboarding.WindowsApps.WindowsAppsTileLarge" Revision="1" Stencil="System.Storyboarding.WindowsApps" StencilVersion="0.1"/>
-</Control>
-</file>
-
-<file path=customXml/item15.xml><?xml version="1.0" encoding="utf-8"?>
-<Control xmlns="http://schemas.microsoft.com/VisualStudio/2011/storyboarding/control">
-  <Id Name="System.Storyboarding.WindowsApps.WindowsAppsTileLarge" Revision="1" Stencil="System.Storyboarding.WindowsApps" StencilVersion="0.1"/>
-</Control>
-</file>
-
-<file path=customXml/item16.xml><?xml version="1.0" encoding="utf-8"?>
-<Control xmlns="http://schemas.microsoft.com/VisualStudio/2011/storyboarding/control">
-  <Id Name="System.Storyboarding.WindowsAppIcons.BaseCircle" Revision="1" Stencil="System.Storyboarding.WindowsAppIcons" StencilVersion="0.1"/>
-</Control>
-</file>
-
-<file path=customXml/item17.xml><?xml version="1.0" encoding="utf-8"?>
-<Control xmlns="http://schemas.microsoft.com/VisualStudio/2011/storyboarding/control">
-  <Id Name="System.Storyboarding.WindowsApps.WindowsAppsTileLarge" Revision="1" Stencil="System.Storyboarding.WindowsApps" StencilVersion="0.1"/>
-</Control>
-</file>
-
-<file path=customXml/item18.xml><?xml version="1.0" encoding="utf-8"?>
-<Control xmlns="http://schemas.microsoft.com/VisualStudio/2011/storyboarding/control">
-  <Id Name="System.Storyboarding.WindowsApps.WindowsAppsTileLarge" Revision="1" Stencil="System.Storyboarding.WindowsApps" StencilVersion="0.1"/>
-</Control>
-</file>
-
-<file path=customXml/item19.xml><?xml version="1.0" encoding="utf-8"?>
-<Control xmlns="http://schemas.microsoft.com/VisualStudio/2011/storyboarding/control">
-  <Id Name="System.Storyboarding.WindowsApps.WindowsAppsTileLarge" Revision="1" Stencil="System.Storyboarding.WindowsApps" StencilVersion="0.1"/>
+  <Id Name="5e505f8e-b0aa-429a-bb4c-92ab0e8a8ee6" RevisionId="d2083f08-ba4f-4330-87aa-e4d23a4443d7" Stencil="172d6d98-e5c9-42e9-a209-79f7a94bbd38" StencilRevisionId="00000000-0000-0000-0000-000000000000" StencilVersion="0.0"/>
 </Control>
 </file>
 
 <file path=customXml/item2.xml><?xml version="1.0" encoding="utf-8"?>
 <Control xmlns="http://schemas.microsoft.com/VisualStudio/2011/storyboarding/control">
-  <Id Name="System.Storyboarding.WindowsApps.WindowsAppsTileLarge" Revision="1" Stencil="System.Storyboarding.WindowsApps" StencilVersion="0.1"/>
-</Control>
-</file>
-
-<file path=customXml/item20.xml><?xml version="1.0" encoding="utf-8"?>
-<Control xmlns="http://schemas.microsoft.com/VisualStudio/2011/storyboarding/control">
-  <Id Name="106b4123-95fe-411e-ad63-fa03c68a702b" RevisionId="6dc69aa2-5737-46d9-89c9-3a85b1eaf3a3" Stencil="172d6d98-e5c9-42e9-a209-79f7a94bbd38" StencilRevisionId="00000000-0000-0000-0000-000000000000" StencilVersion="0.0"/>
-</Control>
-</file>
-
-<file path=customXml/item21.xml><?xml version="1.0" encoding="utf-8"?>
-<Control xmlns="http://schemas.microsoft.com/VisualStudio/2011/storyboarding/control">
-  <Id Name="System.Storyboarding.WindowsApps.WindowsAppsTileLarge" Revision="1" Stencil="System.Storyboarding.WindowsApps" StencilVersion="0.1"/>
-</Control>
-</file>
-
-<file path=customXml/item22.xml><?xml version="1.0" encoding="utf-8"?>
-<Control xmlns="http://schemas.microsoft.com/VisualStudio/2011/storyboarding/control">
-  <Id Name="System.Storyboarding.WindowsAppIcons.Left" Revision="1" Stencil="System.Storyboarding.WindowsAppIcons" StencilVersion="0.1"/>
+  <Id Name="System.Storyboarding.WindowsApps.WindowsAppsListBox" Revision="1" Stencil="System.Storyboarding.WindowsApps" StencilVersion="0.1"/>
 </Control>
 </file>
 
@@ -5081,51 +5168,15 @@
 </Control>
 </file>
 
-<file path=customXml/item4.xml><?xml version="1.0" encoding="utf-8"?>
-<Control xmlns="http://schemas.microsoft.com/VisualStudio/2011/storyboarding/control">
-  <Id Name="System.Storyboarding.WindowsAppIcons.Left" Revision="1" Stencil="System.Storyboarding.WindowsAppIcons" StencilVersion="0.1"/>
-</Control>
-</file>
-
-<file path=customXml/item5.xml><?xml version="1.0" encoding="utf-8"?>
-<Control xmlns="http://schemas.microsoft.com/VisualStudio/2011/storyboarding/control">
-  <Id Name="System.Storyboarding.WindowsApps.WindowsAppsTileLarge" Revision="1" Stencil="System.Storyboarding.WindowsApps" StencilVersion="0.1"/>
-</Control>
-</file>
-
-<file path=customXml/item6.xml><?xml version="1.0" encoding="utf-8"?>
-<Control xmlns="http://schemas.microsoft.com/VisualStudio/2011/storyboarding/control">
-  <Id Name="System.Storyboarding.WindowsApps.WindowsAppsTileLarge" Revision="1" Stencil="System.Storyboarding.WindowsApps" StencilVersion="0.1"/>
-</Control>
-</file>
-
-<file path=customXml/item7.xml><?xml version="1.0" encoding="utf-8"?>
-<Control xmlns="http://schemas.microsoft.com/VisualStudio/2011/storyboarding/control">
-  <Id Name="106b4123-95fe-411e-ad63-fa03c68a702b" RevisionId="6dc69aa2-5737-46d9-89c9-3a85b1eaf3a3" Stencil="172d6d98-e5c9-42e9-a209-79f7a94bbd38" StencilRevisionId="00000000-0000-0000-0000-000000000000" StencilVersion="0.0"/>
-</Control>
-</file>
-
-<file path=customXml/item8.xml><?xml version="1.0" encoding="utf-8"?>
-<Control xmlns="http://schemas.microsoft.com/VisualStudio/2011/storyboarding/control">
-  <Id Name="a2c8d44d-9667-4c53-9e49-e310e6246c4a" RevisionId="9b2c8de1-5094-4c28-9871-718be66a8830" Stencil="172d6d98-e5c9-42e9-a209-79f7a94bbd38" StencilRevisionId="00000000-0000-0000-0000-000000000000" StencilVersion="0.0"/>
-</Control>
-</file>
-
-<file path=customXml/item9.xml><?xml version="1.0" encoding="utf-8"?>
-<Control xmlns="http://schemas.microsoft.com/VisualStudio/2011/storyboarding/control">
-  <Id Name="5e505f8e-b0aa-429a-bb4c-92ab0e8a8ee6" RevisionId="d2083f08-ba4f-4330-87aa-e4d23a4443d7" Stencil="172d6d98-e5c9-42e9-a209-79f7a94bbd38" StencilRevisionId="00000000-0000-0000-0000-000000000000" StencilVersion="0.0"/>
-</Control>
-</file>
-
 <file path=customXml/itemProps1.xml><?xml version="1.0" encoding="utf-8"?>
-<ds:datastoreItem xmlns:ds="http://schemas.openxmlformats.org/officeDocument/2006/customXml" ds:itemID="{B2D91EE3-15B4-4800-A79F-6AF1608C46DB}">
+<ds:datastoreItem xmlns:ds="http://schemas.openxmlformats.org/officeDocument/2006/customXml" ds:itemID="{DDAECFBE-9BBA-4B18-AFB8-CA15EB292EB2}">
   <ds:schemaRefs>
     <ds:schemaRef ds:uri="http://schemas.microsoft.com/VisualStudio/2011/storyboarding/control"/>
   </ds:schemaRefs>
 </ds:datastoreItem>
 </file>
 
-<file path=customXml/itemProps10.xml><?xml version="1.0" encoding="utf-8"?>
+<file path=customXml/itemProps2.xml><?xml version="1.0" encoding="utf-8"?>
 <ds:datastoreItem xmlns:ds="http://schemas.openxmlformats.org/officeDocument/2006/customXml" ds:itemID="{9D3990D7-B337-470C-9A2A-6B1A714B1780}">
   <ds:schemaRefs>
     <ds:schemaRef ds:uri="http://schemas.microsoft.com/VisualStudio/2011/storyboarding/control"/>
@@ -5133,162 +5184,10 @@
 </ds:datastoreItem>
 </file>
 
-<file path=customXml/itemProps11.xml><?xml version="1.0" encoding="utf-8"?>
-<ds:datastoreItem xmlns:ds="http://schemas.openxmlformats.org/officeDocument/2006/customXml" ds:itemID="{130AE95A-5016-47D6-87AB-10BCCDAA0E1A}">
-  <ds:schemaRefs>
-    <ds:schemaRef ds:uri="http://schemas.microsoft.com/VisualStudio/2011/storyboarding/control"/>
-  </ds:schemaRefs>
-</ds:datastoreItem>
-</file>
-
-<file path=customXml/itemProps12.xml><?xml version="1.0" encoding="utf-8"?>
-<ds:datastoreItem xmlns:ds="http://schemas.openxmlformats.org/officeDocument/2006/customXml" ds:itemID="{1885A745-6CFE-4AC0-A6B9-2C16D063A4D4}">
-  <ds:schemaRefs>
-    <ds:schemaRef ds:uri="http://schemas.microsoft.com/VisualStudio/2011/storyboarding/control"/>
-  </ds:schemaRefs>
-</ds:datastoreItem>
-</file>
-
-<file path=customXml/itemProps13.xml><?xml version="1.0" encoding="utf-8"?>
-<ds:datastoreItem xmlns:ds="http://schemas.openxmlformats.org/officeDocument/2006/customXml" ds:itemID="{E59943D4-B61C-40D9-8F36-8BDB14B9BBDF}">
-  <ds:schemaRefs>
-    <ds:schemaRef ds:uri="http://schemas.microsoft.com/VisualStudio/2011/storyboarding/control"/>
-  </ds:schemaRefs>
-</ds:datastoreItem>
-</file>
-
-<file path=customXml/itemProps14.xml><?xml version="1.0" encoding="utf-8"?>
+<file path=customXml/itemProps3.xml><?xml version="1.0" encoding="utf-8"?>
 <ds:datastoreItem xmlns:ds="http://schemas.openxmlformats.org/officeDocument/2006/customXml" ds:itemID="{9AEB2DB6-BC11-474C-9E01-6F84B44127A2}">
   <ds:schemaRefs>
     <ds:schemaRef ds:uri="http://schemas.microsoft.com/VisualStudio/2011/storyboarding/control"/>
   </ds:schemaRefs>
 </ds:datastoreItem>
-</file>
-
-<file path=customXml/itemProps15.xml><?xml version="1.0" encoding="utf-8"?>
-<ds:datastoreItem xmlns:ds="http://schemas.openxmlformats.org/officeDocument/2006/customXml" ds:itemID="{E3B12B45-E23D-4F9E-BFAE-D528ED700D7D}">
-  <ds:schemaRefs>
-    <ds:schemaRef ds:uri="http://schemas.microsoft.com/VisualStudio/2011/storyboarding/control"/>
-  </ds:schemaRefs>
-</ds:datastoreItem>
-</file>
-
-<file path=customXml/itemProps16.xml><?xml version="1.0" encoding="utf-8"?>
-<ds:datastoreItem xmlns:ds="http://schemas.openxmlformats.org/officeDocument/2006/customXml" ds:itemID="{17EE919F-3D6D-416C-AAAB-05D1F49193EF}">
-  <ds:schemaRefs>
-    <ds:schemaRef ds:uri="http://schemas.microsoft.com/VisualStudio/2011/storyboarding/control"/>
-  </ds:schemaRefs>
-</ds:datastoreItem>
-</file>
-
-<file path=customXml/itemProps17.xml><?xml version="1.0" encoding="utf-8"?>
-<ds:datastoreItem xmlns:ds="http://schemas.openxmlformats.org/officeDocument/2006/customXml" ds:itemID="{A69C42C4-D6FD-4DF7-BF2E-9D2509396AE0}">
-  <ds:schemaRefs>
-    <ds:schemaRef ds:uri="http://schemas.microsoft.com/VisualStudio/2011/storyboarding/control"/>
-  </ds:schemaRefs>
-</ds:datastoreItem>
-</file>
-
-<file path=customXml/itemProps18.xml><?xml version="1.0" encoding="utf-8"?>
-<ds:datastoreItem xmlns:ds="http://schemas.openxmlformats.org/officeDocument/2006/customXml" ds:itemID="{E067EBE0-A8A8-4928-8FE9-0D76B66E625B}">
-  <ds:schemaRefs>
-    <ds:schemaRef ds:uri="http://schemas.microsoft.com/VisualStudio/2011/storyboarding/control"/>
-  </ds:schemaRefs>
-</ds:datastoreItem>
-</file>
-
-<file path=customXml/itemProps19.xml><?xml version="1.0" encoding="utf-8"?>
-<ds:datastoreItem xmlns:ds="http://schemas.openxmlformats.org/officeDocument/2006/customXml" ds:itemID="{0707ED0E-680D-4067-B800-F785F4D1EE6A}">
-  <ds:schemaRefs>
-    <ds:schemaRef ds:uri="http://schemas.microsoft.com/VisualStudio/2011/storyboarding/control"/>
-  </ds:schemaRefs>
-</ds:datastoreItem>
-</file>
-
-<file path=customXml/itemProps2.xml><?xml version="1.0" encoding="utf-8"?>
-<ds:datastoreItem xmlns:ds="http://schemas.openxmlformats.org/officeDocument/2006/customXml" ds:itemID="{F949B875-EC71-4FEA-A23A-8DD271A3CBB0}">
-  <ds:schemaRefs>
-    <ds:schemaRef ds:uri="http://schemas.microsoft.com/VisualStudio/2011/storyboarding/control"/>
-  </ds:schemaRefs>
-</ds:datastoreItem>
-</file>
-
-<file path=customXml/itemProps20.xml><?xml version="1.0" encoding="utf-8"?>
-<ds:datastoreItem xmlns:ds="http://schemas.openxmlformats.org/officeDocument/2006/customXml" ds:itemID="{3A552C6E-5E37-4690-A85C-7D325B809EF5}">
-  <ds:schemaRefs>
-    <ds:schemaRef ds:uri="http://schemas.microsoft.com/VisualStudio/2011/storyboarding/control"/>
-  </ds:schemaRefs>
-</ds:datastoreItem>
-</file>
-
-<file path=customXml/itemProps21.xml><?xml version="1.0" encoding="utf-8"?>
-<ds:datastoreItem xmlns:ds="http://schemas.openxmlformats.org/officeDocument/2006/customXml" ds:itemID="{0D44F594-561C-4167-AA9F-3893A3CAA17D}">
-  <ds:schemaRefs>
-    <ds:schemaRef ds:uri="http://schemas.microsoft.com/VisualStudio/2011/storyboarding/control"/>
-  </ds:schemaRefs>
-</ds:datastoreItem>
-</file>
-
-<file path=customXml/itemProps22.xml><?xml version="1.0" encoding="utf-8"?>
-<ds:datastoreItem xmlns:ds="http://schemas.openxmlformats.org/officeDocument/2006/customXml" ds:itemID="{08E0E6B1-8FC1-4BFD-845D-668503B722F9}">
-  <ds:schemaRefs>
-    <ds:schemaRef ds:uri="http://schemas.microsoft.com/VisualStudio/2011/storyboarding/control"/>
-  </ds:schemaRefs>
-</ds:datastoreItem>
-</file>
-
-<file path=customXml/itemProps3.xml><?xml version="1.0" encoding="utf-8"?>
-<ds:datastoreItem xmlns:ds="http://schemas.openxmlformats.org/officeDocument/2006/customXml" ds:itemID="{764B0327-A629-457E-AA74-D087BE39C0C5}">
-  <ds:schemaRefs>
-    <ds:schemaRef ds:uri="http://schemas.microsoft.com/VisualStudio/2011/storyboarding/control"/>
-  </ds:schemaRefs>
-</ds:datastoreItem>
-</file>
-
-<file path=customXml/itemProps4.xml><?xml version="1.0" encoding="utf-8"?>
-<ds:datastoreItem xmlns:ds="http://schemas.openxmlformats.org/officeDocument/2006/customXml" ds:itemID="{963791F8-D4CE-4ACD-9B0B-E2CB22816259}">
-  <ds:schemaRefs>
-    <ds:schemaRef ds:uri="http://schemas.microsoft.com/VisualStudio/2011/storyboarding/control"/>
-  </ds:schemaRefs>
-</ds:datastoreItem>
-</file>
-
-<file path=customXml/itemProps5.xml><?xml version="1.0" encoding="utf-8"?>
-<ds:datastoreItem xmlns:ds="http://schemas.openxmlformats.org/officeDocument/2006/customXml" ds:itemID="{3B8A761D-1BE0-4A2C-A45C-9D30E07EAA7B}">
-  <ds:schemaRefs>
-    <ds:schemaRef ds:uri="http://schemas.microsoft.com/VisualStudio/2011/storyboarding/control"/>
-  </ds:schemaRefs>
-</ds:datastoreItem>
-</file>
-
-<file path=customXml/itemProps6.xml><?xml version="1.0" encoding="utf-8"?>
-<ds:datastoreItem xmlns:ds="http://schemas.openxmlformats.org/officeDocument/2006/customXml" ds:itemID="{A6B3C1DA-1263-42AE-AFF5-FE5E7BDC865E}">
-  <ds:schemaRefs>
-    <ds:schemaRef ds:uri="http://schemas.microsoft.com/VisualStudio/2011/storyboarding/control"/>
-  </ds:schemaRefs>
-</ds:datastoreItem>
-</file>
-
-<file path=customXml/itemProps7.xml><?xml version="1.0" encoding="utf-8"?>
-<ds:datastoreItem xmlns:ds="http://schemas.openxmlformats.org/officeDocument/2006/customXml" ds:itemID="{1F2F6B97-222E-4752-BAF2-9BAEB7473B11}">
-  <ds:schemaRefs>
-    <ds:schemaRef ds:uri="http://schemas.microsoft.com/VisualStudio/2011/storyboarding/control"/>
-  </ds:schemaRefs>
-</ds:datastoreItem>
-</file>
-
-<file path=customXml/itemProps8.xml><?xml version="1.0" encoding="utf-8"?>
-<ds:datastoreItem xmlns:ds="http://schemas.openxmlformats.org/officeDocument/2006/customXml" ds:itemID="{D6AF2AD4-A40B-4858-AB00-C08D263E051D}">
-  <ds:schemaRefs>
-    <ds:schemaRef ds:uri="http://schemas.microsoft.com/VisualStudio/2011/storyboarding/control"/>
-  </ds:schemaRefs>
-</ds:datastoreItem>
-</file>
-
-<file path=customXml/itemProps9.xml><?xml version="1.0" encoding="utf-8"?>
-<ds:datastoreItem xmlns:ds="http://schemas.openxmlformats.org/officeDocument/2006/customXml" ds:itemID="{DDAECFBE-9BBA-4B18-AFB8-CA15EB292EB2}">
-  <ds:schemaRefs>
-    <ds:schemaRef ds:uri="http://schemas.microsoft.com/VisualStudio/2011/storyboarding/control"/>
-  </ds:schemaRefs>
-</ds:datastoreItem>
 </file>
</xml_diff>